<commit_message>
Add lecture about interview
</commit_message>
<xml_diff>
--- a/A Day in life of a freshman.pptx
+++ b/A Day in life of a freshman.pptx
@@ -238,7 +238,7 @@
           <a:p>
             <a:fld id="{7FF95820-84BB-3447-8286-60A51307E7F2}" type="datetimeFigureOut">
               <a:rPr lang="en-US" smtClean="0"/>
-              <a:t>11/16/2023</a:t>
+              <a:t>11/17/2023</a:t>
             </a:fld>
             <a:endParaRPr lang="en-US" dirty="0"/>
           </a:p>
@@ -416,7 +416,7 @@
           <a:p>
             <a:fld id="{FC08FC54-6AE4-6A4A-9756-823A0F1BE5A6}" type="datetimeFigureOut">
               <a:rPr lang="en-US" smtClean="0"/>
-              <a:t>11/16/2023</a:t>
+              <a:t>11/17/2023</a:t>
             </a:fld>
             <a:endParaRPr lang="en-US" dirty="0"/>
           </a:p>
@@ -11698,7 +11698,7 @@
                 <a:ea typeface="+mn-lt"/>
                 <a:cs typeface="+mn-lt"/>
               </a:rPr>
-              <a:t>He usually doesn’t do homework at home so he does his homework in other classes this action cause he can’t concentrate on listening</a:t>
+              <a:t>He usually doesn’t do homework at home so he does his homework in other classes this makes him not concentrate on listening</a:t>
             </a:r>
             <a:r>
               <a:rPr lang="fa-IR" dirty="0">
@@ -11742,7 +11742,7 @@
                 <a:ea typeface="+mn-lt"/>
                 <a:cs typeface="+mn-lt"/>
               </a:rPr>
-              <a:t>He has another class but he doesn’t participate in class instead his friends and he go to billiard.</a:t>
+              <a:t>He has another class but he doesn’t participate in class Instead, his friends and he go to billiard.</a:t>
             </a:r>
           </a:p>
           <a:p>
@@ -11784,19 +11784,8 @@
                 <a:ea typeface="+mn-lt"/>
                 <a:cs typeface="+mn-lt"/>
               </a:rPr>
-              <a:t>In my opinion, if he keeps on his manner, he won’t have a future. Because it seems he doesn’t any try for </a:t>
-            </a:r>
-            <a:r>
-              <a:rPr lang="en-US">
-                <a:ea typeface="+mn-lt"/>
-                <a:cs typeface="+mn-lt"/>
-              </a:rPr>
-              <a:t>his future.</a:t>
-            </a:r>
-            <a:endParaRPr lang="en-US" dirty="0">
-              <a:ea typeface="+mn-lt"/>
-              <a:cs typeface="+mn-lt"/>
-            </a:endParaRPr>
+              <a:t>In my opinion, if he keeps on his manner, he won’t have a future. Because it seems he doesn’t any try for his future.</a:t>
+            </a:r>
           </a:p>
           <a:p>
             <a:pPr marL="0" indent="0">
@@ -12059,22 +12048,7 @@
               <a:rPr lang="en-US" sz="2000" dirty="0">
                 <a:effectLst/>
               </a:rPr>
-              <a:t>If a person wants to be successful, (</a:t>
-            </a:r>
-            <a:r>
-              <a:rPr lang="en-US" sz="2000" dirty="0">
-                <a:effectLst/>
-                <a:highlight>
-                  <a:srgbClr val="FFFF00"/>
-                </a:highlight>
-              </a:rPr>
-              <a:t>he/she</a:t>
-            </a:r>
-            <a:r>
-              <a:rPr lang="en-US" sz="2000" dirty="0">
-                <a:effectLst/>
-              </a:rPr>
-              <a:t>) must try hard, especially when he goes to university, because the university is an important place to recognize your future and what you do in the future.</a:t>
+              <a:t>If a person wants to be successful, they must try hard, especially when he goes to university, because the university is an important place to recognize your future and what you do in the future.</a:t>
             </a:r>
           </a:p>
           <a:p>
@@ -12089,19 +12063,7 @@
             </a:r>
             <a:r>
               <a:rPr lang="en-US" sz="2000" dirty="0"/>
-              <a:t>(</a:t>
-            </a:r>
-            <a:r>
-              <a:rPr lang="en-US" sz="2000" dirty="0">
-                <a:highlight>
-                  <a:srgbClr val="FFFF00"/>
-                </a:highlight>
-              </a:rPr>
-              <a:t>have to/ must</a:t>
-            </a:r>
-            <a:r>
-              <a:rPr lang="en-US" sz="2000" dirty="0"/>
-              <a:t>) </a:t>
+              <a:t>(have to) </a:t>
             </a:r>
             <a:r>
               <a:rPr lang="en-US" sz="2000" dirty="0">
@@ -12120,19 +12082,15 @@
           <a:p>
             <a:r>
               <a:rPr lang="en-US" sz="2000" dirty="0"/>
-              <a:t>If you want to get good grades, you (</a:t>
-            </a:r>
-            <a:r>
-              <a:rPr lang="en-US" sz="2000" dirty="0">
-                <a:highlight>
-                  <a:srgbClr val="FFFF00"/>
-                </a:highlight>
-              </a:rPr>
-              <a:t>have to/ must</a:t>
+              <a:t>If you want to get good grades, </a:t>
+            </a:r>
+            <a:r>
+              <a:rPr lang="en-US" sz="2000"/>
+              <a:t>you have to </a:t>
             </a:r>
             <a:r>
               <a:rPr lang="en-US" sz="2000" dirty="0"/>
-              <a:t>) study hard, so you must control your time and don’t waste time.</a:t>
+              <a:t>study hard, so you must control your time and not waste time.</a:t>
             </a:r>
           </a:p>
           <a:p>
@@ -12141,7 +12099,7 @@
           <a:p>
             <a:r>
               <a:rPr lang="en-US" sz="2000" dirty="0"/>
-              <a:t>You should study and hang out with friends and have a fun together. So you should have a plane for your life </a:t>
+              <a:t>You should study and hang out with friends and have fun together. So you should have a plan for your life </a:t>
             </a:r>
           </a:p>
           <a:p>
@@ -13235,6 +13193,15 @@
 </file>
 
 <file path=customXml/item2.xml><?xml version="1.0" encoding="utf-8"?>
+<?mso-contentType ?>
+<FormTemplates xmlns="http://schemas.microsoft.com/sharepoint/v3/contenttype/forms">
+  <Display>DocumentLibraryForm</Display>
+  <Edit>DocumentLibraryForm</Edit>
+  <New>DocumentLibraryForm</New>
+</FormTemplates>
+</file>
+
+<file path=customXml/item3.xml><?xml version="1.0" encoding="utf-8"?>
 <ct:contentTypeSchema xmlns:ct="http://schemas.microsoft.com/office/2006/metadata/contentType" xmlns:ma="http://schemas.microsoft.com/office/2006/metadata/properties/metaAttributes" ct:_="" ma:_="" ma:contentTypeName="Document" ma:contentTypeID="0x01010079F111ED35F8CC479449609E8A0923A6" ma:contentTypeVersion="25" ma:contentTypeDescription="Create a new document." ma:contentTypeScope="" ma:versionID="e02306daf00165b375dc6a58966960be">
   <xsd:schema xmlns:xsd="http://www.w3.org/2001/XMLSchema" xmlns:xs="http://www.w3.org/2001/XMLSchema" xmlns:p="http://schemas.microsoft.com/office/2006/metadata/properties" xmlns:ns1="http://schemas.microsoft.com/sharepoint/v3" xmlns:ns2="71af3243-3dd4-4a8d-8c0d-dd76da1f02a5" xmlns:ns3="16c05727-aa75-4e4a-9b5f-8a80a1165891" xmlns:ns4="230e9df3-be65-4c73-a93b-d1236ebd677e" targetNamespace="http://schemas.microsoft.com/office/2006/metadata/properties" ma:root="true" ma:fieldsID="df88fb76bf5f555224557953949c1ec9" ns1:_="" ns2:_="" ns3:_="" ns4:_="">
     <xsd:import namespace="http://schemas.microsoft.com/sharepoint/v3"/>
@@ -13528,15 +13495,6 @@
 </ct:contentTypeSchema>
 </file>
 
-<file path=customXml/item3.xml><?xml version="1.0" encoding="utf-8"?>
-<?mso-contentType ?>
-<FormTemplates xmlns="http://schemas.microsoft.com/sharepoint/v3/contenttype/forms">
-  <Display>DocumentLibraryForm</Display>
-  <Edit>DocumentLibraryForm</Edit>
-  <New>DocumentLibraryForm</New>
-</FormTemplates>
-</file>
-
 <file path=customXml/itemProps1.xml><?xml version="1.0" encoding="utf-8"?>
 <ds:datastoreItem xmlns:ds="http://schemas.openxmlformats.org/officeDocument/2006/customXml" ds:itemID="{99746342-5E84-430E-9251-61001F208E7A}">
   <ds:schemaRefs>
@@ -13550,6 +13508,14 @@
 </file>
 
 <file path=customXml/itemProps2.xml><?xml version="1.0" encoding="utf-8"?>
+<ds:datastoreItem xmlns:ds="http://schemas.openxmlformats.org/officeDocument/2006/customXml" ds:itemID="{0E8B3377-22F1-4153-96F0-CC2E4BE41C57}">
+  <ds:schemaRefs>
+    <ds:schemaRef ds:uri="http://schemas.microsoft.com/sharepoint/v3/contenttype/forms"/>
+  </ds:schemaRefs>
+</ds:datastoreItem>
+</file>
+
+<file path=customXml/itemProps3.xml><?xml version="1.0" encoding="utf-8"?>
 <ds:datastoreItem xmlns:ds="http://schemas.openxmlformats.org/officeDocument/2006/customXml" ds:itemID="{2EB2FABB-45EC-440E-B647-8CA57BA45ACA}">
   <ds:schemaRefs>
     <ds:schemaRef ds:uri="http://schemas.microsoft.com/office/2006/metadata/contentType"/>
@@ -13570,14 +13536,6 @@
 </ds:datastoreItem>
 </file>
 
-<file path=customXml/itemProps3.xml><?xml version="1.0" encoding="utf-8"?>
-<ds:datastoreItem xmlns:ds="http://schemas.openxmlformats.org/officeDocument/2006/customXml" ds:itemID="{0E8B3377-22F1-4153-96F0-CC2E4BE41C57}">
-  <ds:schemaRefs>
-    <ds:schemaRef ds:uri="http://schemas.microsoft.com/sharepoint/v3/contenttype/forms"/>
-  </ds:schemaRefs>
-</ds:datastoreItem>
-</file>
-
 <file path=docMetadata/LabelInfo.xml><?xml version="1.0" encoding="utf-8"?>
 <clbl:labelList xmlns:clbl="http://schemas.microsoft.com/office/2020/mipLabelMetadata"/>
 </file>
</xml_diff>